<commit_message>
Last minute modification for the presentation
</commit_message>
<xml_diff>
--- a/Documents/QuentinRivollat&GibranChevalley_Analyse_resultats.pptx
+++ b/Documents/QuentinRivollat&GibranChevalley_Analyse_resultats.pptx
@@ -6,23 +6,25 @@
     <p:sldMasterId id="2147483711" r:id="rId2"/>
   </p:sldMasterIdLst>
   <p:notesMasterIdLst>
-    <p:notesMasterId r:id="rId17"/>
+    <p:notesMasterId r:id="rId19"/>
   </p:notesMasterIdLst>
   <p:sldIdLst>
     <p:sldId id="256" r:id="rId3"/>
     <p:sldId id="289" r:id="rId4"/>
     <p:sldId id="292" r:id="rId5"/>
     <p:sldId id="299" r:id="rId6"/>
-    <p:sldId id="301" r:id="rId7"/>
-    <p:sldId id="298" r:id="rId8"/>
-    <p:sldId id="300" r:id="rId9"/>
-    <p:sldId id="302" r:id="rId10"/>
-    <p:sldId id="293" r:id="rId11"/>
-    <p:sldId id="294" r:id="rId12"/>
-    <p:sldId id="295" r:id="rId13"/>
-    <p:sldId id="296" r:id="rId14"/>
-    <p:sldId id="297" r:id="rId15"/>
-    <p:sldId id="287" r:id="rId16"/>
+    <p:sldId id="303" r:id="rId7"/>
+    <p:sldId id="301" r:id="rId8"/>
+    <p:sldId id="298" r:id="rId9"/>
+    <p:sldId id="300" r:id="rId10"/>
+    <p:sldId id="302" r:id="rId11"/>
+    <p:sldId id="293" r:id="rId12"/>
+    <p:sldId id="294" r:id="rId13"/>
+    <p:sldId id="295" r:id="rId14"/>
+    <p:sldId id="296" r:id="rId15"/>
+    <p:sldId id="297" r:id="rId16"/>
+    <p:sldId id="304" r:id="rId17"/>
+    <p:sldId id="287" r:id="rId18"/>
   </p:sldIdLst>
   <p:sldSz cx="12192000" cy="6858000"/>
   <p:notesSz cx="6858000" cy="9144000"/>
@@ -9752,7 +9754,7 @@
           <a:p>
             <a:r>
               <a:rPr lang="fr-CH" sz="2800" dirty="0"/>
-              <a:t>Phase d’introduction</a:t>
+              <a:t>Questionnaire initiale</a:t>
             </a:r>
           </a:p>
         </p:txBody>
@@ -9769,8 +9771,8 @@
         </p:nvSpPr>
         <p:spPr>
           <a:xfrm>
-            <a:off x="743236" y="3710223"/>
-            <a:ext cx="4438363" cy="1323096"/>
+            <a:off x="743237" y="3710223"/>
+            <a:ext cx="3319370" cy="799363"/>
           </a:xfrm>
         </p:spPr>
         <p:txBody>
@@ -9780,42 +9782,34 @@
           <a:lstStyle/>
           <a:p>
             <a:r>
-              <a:rPr lang="fr-FR" sz="1600" dirty="0"/>
-              <a:t>Explication des règles</a:t>
-            </a:r>
-          </a:p>
-          <a:p>
-            <a:r>
-              <a:rPr lang="fr-FR" sz="1600" dirty="0"/>
-              <a:t>Jouer </a:t>
-            </a:r>
-            <a:r>
               <a:rPr lang="fr-FR" sz="1600" dirty="0" smtClean="0"/>
-              <a:t>pour </a:t>
-            </a:r>
-            <a:r>
-              <a:rPr lang="fr-FR" sz="1600" dirty="0"/>
-              <a:t>se familiariser</a:t>
-            </a:r>
-            <a:endParaRPr lang="fr-CH" sz="1600" dirty="0"/>
+              <a:t>Familiarité avec les jeux-vidéos</a:t>
+            </a:r>
+            <a:endParaRPr lang="fr-CH" sz="1200" dirty="0"/>
+          </a:p>
+          <a:p>
+            <a:r>
+              <a:rPr lang="fr-FR" sz="1600" dirty="0" smtClean="0"/>
+              <a:t>Stresse au quotidien</a:t>
+            </a:r>
           </a:p>
         </p:txBody>
       </p:sp>
     </p:spTree>
     <p:extLst>
       <p:ext uri="{BB962C8B-B14F-4D97-AF65-F5344CB8AC3E}">
-        <p14:creationId xmlns:p14="http://schemas.microsoft.com/office/powerpoint/2010/main" val="2994690250"/>
+        <p14:creationId xmlns:p14="http://schemas.microsoft.com/office/powerpoint/2010/main" val="4284955040"/>
       </p:ext>
     </p:extLst>
   </p:cSld>
   <p:clrMapOvr>
     <a:masterClrMapping/>
   </p:clrMapOvr>
-  <mc:AlternateContent xmlns:mc="http://schemas.openxmlformats.org/markup-compatibility/2006">
-    <mc:Choice xmlns:p14="http://schemas.microsoft.com/office/powerpoint/2010/main" Requires="p14">
+  <mc:AlternateContent xmlns:mc="http://schemas.openxmlformats.org/markup-compatibility/2006" xmlns:p14="http://schemas.microsoft.com/office/powerpoint/2010/main">
+    <mc:Choice Requires="p14">
       <p:transition spd="slow" p14:dur="2000"/>
     </mc:Choice>
-    <mc:Fallback>
+    <mc:Fallback xmlns="">
       <p:transition spd="slow"/>
     </mc:Fallback>
   </mc:AlternateContent>
@@ -9900,7 +9894,7 @@
         <p:spPr>
           <a:xfrm>
             <a:off x="743237" y="2799654"/>
-            <a:ext cx="1163267" cy="523220"/>
+            <a:ext cx="3319370" cy="523220"/>
           </a:xfrm>
           <a:prstGeom prst="rect">
             <a:avLst/>
@@ -9914,10 +9908,9 @@
           <a:lstStyle/>
           <a:p>
             <a:r>
-              <a:rPr lang="fr-CH" sz="2800" dirty="0" smtClean="0"/>
-              <a:t>Tâches</a:t>
-            </a:r>
-            <a:endParaRPr lang="fr-CH" sz="2800" dirty="0"/>
+              <a:rPr lang="fr-CH" sz="2800" dirty="0"/>
+              <a:t>Phase d’introduction</a:t>
+            </a:r>
           </a:p>
         </p:txBody>
       </p:sp>
@@ -9934,7 +9927,7 @@
         <p:spPr>
           <a:xfrm>
             <a:off x="743236" y="3710223"/>
-            <a:ext cx="6852050" cy="1323096"/>
+            <a:ext cx="4438363" cy="1323096"/>
           </a:xfrm>
         </p:spPr>
         <p:txBody>
@@ -9944,8 +9937,22 @@
           <a:lstStyle/>
           <a:p>
             <a:r>
+              <a:rPr lang="fr-FR" sz="1600" dirty="0"/>
+              <a:t>Explication des règles</a:t>
+            </a:r>
+          </a:p>
+          <a:p>
+            <a:r>
+              <a:rPr lang="fr-FR" sz="1600" dirty="0"/>
+              <a:t>Jouer </a:t>
+            </a:r>
+            <a:r>
               <a:rPr lang="fr-FR" sz="1600" dirty="0" smtClean="0"/>
-              <a:t>4 tâches où les deux paramètres de nos hypothèses varient</a:t>
+              <a:t>pour </a:t>
+            </a:r>
+            <a:r>
+              <a:rPr lang="fr-FR" sz="1600" dirty="0"/>
+              <a:t>se familiariser</a:t>
             </a:r>
             <a:endParaRPr lang="fr-CH" sz="1600" dirty="0"/>
           </a:p>
@@ -9954,18 +9961,18 @@
     </p:spTree>
     <p:extLst>
       <p:ext uri="{BB962C8B-B14F-4D97-AF65-F5344CB8AC3E}">
-        <p14:creationId xmlns:p14="http://schemas.microsoft.com/office/powerpoint/2010/main" val="930066963"/>
+        <p14:creationId xmlns:p14="http://schemas.microsoft.com/office/powerpoint/2010/main" val="2994690250"/>
       </p:ext>
     </p:extLst>
   </p:cSld>
   <p:clrMapOvr>
     <a:masterClrMapping/>
   </p:clrMapOvr>
-  <mc:AlternateContent xmlns:mc="http://schemas.openxmlformats.org/markup-compatibility/2006">
-    <mc:Choice xmlns:p14="http://schemas.microsoft.com/office/powerpoint/2010/main" Requires="p14">
+  <mc:AlternateContent xmlns:mc="http://schemas.openxmlformats.org/markup-compatibility/2006" xmlns:p14="http://schemas.microsoft.com/office/powerpoint/2010/main">
+    <mc:Choice Requires="p14">
       <p:transition spd="slow" p14:dur="2000"/>
     </mc:Choice>
-    <mc:Fallback>
+    <mc:Fallback xmlns="">
       <p:transition spd="slow"/>
     </mc:Fallback>
   </mc:AlternateContent>
@@ -10050,7 +10057,7 @@
         <p:spPr>
           <a:xfrm>
             <a:off x="743237" y="2799654"/>
-            <a:ext cx="5001369" cy="523220"/>
+            <a:ext cx="1163267" cy="523220"/>
           </a:xfrm>
           <a:prstGeom prst="rect">
             <a:avLst/>
@@ -10065,7 +10072,7 @@
           <a:p>
             <a:r>
               <a:rPr lang="fr-CH" sz="2800" dirty="0" smtClean="0"/>
-              <a:t>Questionnaire post-expérimental</a:t>
+              <a:t>Tâches</a:t>
             </a:r>
             <a:endParaRPr lang="fr-CH" sz="2800" dirty="0"/>
           </a:p>
@@ -10093,6 +10100,10 @@
           </a:bodyPr>
           <a:lstStyle/>
           <a:p>
+            <a:r>
+              <a:rPr lang="fr-FR" sz="1600" dirty="0" smtClean="0"/>
+              <a:t>4 tâches où les deux paramètres de nos hypothèses varient</a:t>
+            </a:r>
             <a:endParaRPr lang="fr-CH" sz="1600" dirty="0"/>
           </a:p>
         </p:txBody>
@@ -10100,18 +10111,18 @@
     </p:spTree>
     <p:extLst>
       <p:ext uri="{BB962C8B-B14F-4D97-AF65-F5344CB8AC3E}">
-        <p14:creationId xmlns:p14="http://schemas.microsoft.com/office/powerpoint/2010/main" val="1361261247"/>
+        <p14:creationId xmlns:p14="http://schemas.microsoft.com/office/powerpoint/2010/main" val="930066963"/>
       </p:ext>
     </p:extLst>
   </p:cSld>
   <p:clrMapOvr>
     <a:masterClrMapping/>
   </p:clrMapOvr>
-  <mc:AlternateContent xmlns:mc="http://schemas.openxmlformats.org/markup-compatibility/2006">
-    <mc:Choice xmlns:p14="http://schemas.microsoft.com/office/powerpoint/2010/main" Requires="p14">
+  <mc:AlternateContent xmlns:mc="http://schemas.openxmlformats.org/markup-compatibility/2006" xmlns:p14="http://schemas.microsoft.com/office/powerpoint/2010/main">
+    <mc:Choice Requires="p14">
       <p:transition spd="slow" p14:dur="2000"/>
     </mc:Choice>
-    <mc:Fallback>
+    <mc:Fallback xmlns="">
       <p:transition spd="slow"/>
     </mc:Fallback>
   </mc:AlternateContent>
@@ -10158,6 +10169,152 @@
           <a:lstStyle/>
           <a:p>
             <a:r>
+              <a:rPr lang="fr-CH" dirty="0"/>
+              <a:t>Mode d’évaluation prévu</a:t>
+            </a:r>
+          </a:p>
+        </p:txBody>
+      </p:sp>
+      <p:sp>
+        <p:nvSpPr>
+          <p:cNvPr id="4" name="Espace réservé du numéro de diapositive 3"/>
+          <p:cNvSpPr>
+            <a:spLocks noGrp="1"/>
+          </p:cNvSpPr>
+          <p:nvPr>
+            <p:ph type="sldNum" sz="quarter" idx="12"/>
+          </p:nvPr>
+        </p:nvSpPr>
+        <p:spPr/>
+        <p:txBody>
+          <a:bodyPr/>
+          <a:lstStyle/>
+          <a:p>
+            <a:fld id="{F60449C3-8BCD-4455-8E2A-A866209B9601}" type="slidenum">
+              <a:rPr lang="fr-CH" smtClean="0"/>
+              <a:t>13</a:t>
+            </a:fld>
+            <a:endParaRPr lang="fr-CH"/>
+          </a:p>
+        </p:txBody>
+      </p:sp>
+      <p:sp>
+        <p:nvSpPr>
+          <p:cNvPr id="5" name="ZoneTexte 4"/>
+          <p:cNvSpPr txBox="1"/>
+          <p:nvPr/>
+        </p:nvSpPr>
+        <p:spPr>
+          <a:xfrm>
+            <a:off x="743237" y="2799654"/>
+            <a:ext cx="5001369" cy="523220"/>
+          </a:xfrm>
+          <a:prstGeom prst="rect">
+            <a:avLst/>
+          </a:prstGeom>
+          <a:noFill/>
+        </p:spPr>
+        <p:txBody>
+          <a:bodyPr wrap="none" rtlCol="0">
+            <a:spAutoFit/>
+          </a:bodyPr>
+          <a:lstStyle/>
+          <a:p>
+            <a:r>
+              <a:rPr lang="fr-CH" sz="2800" dirty="0" smtClean="0"/>
+              <a:t>Questionnaire post-expérimental</a:t>
+            </a:r>
+            <a:endParaRPr lang="fr-CH" sz="2800" dirty="0"/>
+          </a:p>
+        </p:txBody>
+      </p:sp>
+      <p:sp>
+        <p:nvSpPr>
+          <p:cNvPr id="6" name="Espace réservé du contenu 2"/>
+          <p:cNvSpPr>
+            <a:spLocks noGrp="1"/>
+          </p:cNvSpPr>
+          <p:nvPr>
+            <p:ph idx="1"/>
+          </p:nvPr>
+        </p:nvSpPr>
+        <p:spPr>
+          <a:xfrm>
+            <a:off x="743236" y="3710223"/>
+            <a:ext cx="6852050" cy="1323096"/>
+          </a:xfrm>
+        </p:spPr>
+        <p:txBody>
+          <a:bodyPr>
+            <a:normAutofit/>
+          </a:bodyPr>
+          <a:lstStyle/>
+          <a:p>
+            <a:endParaRPr lang="fr-CH" sz="1600" dirty="0"/>
+          </a:p>
+        </p:txBody>
+      </p:sp>
+    </p:spTree>
+    <p:extLst>
+      <p:ext uri="{BB962C8B-B14F-4D97-AF65-F5344CB8AC3E}">
+        <p14:creationId xmlns:p14="http://schemas.microsoft.com/office/powerpoint/2010/main" val="1361261247"/>
+      </p:ext>
+    </p:extLst>
+  </p:cSld>
+  <p:clrMapOvr>
+    <a:masterClrMapping/>
+  </p:clrMapOvr>
+  <mc:AlternateContent xmlns:mc="http://schemas.openxmlformats.org/markup-compatibility/2006" xmlns:p14="http://schemas.microsoft.com/office/powerpoint/2010/main">
+    <mc:Choice Requires="p14">
+      <p:transition spd="slow" p14:dur="2000"/>
+    </mc:Choice>
+    <mc:Fallback xmlns="">
+      <p:transition spd="slow"/>
+    </mc:Fallback>
+  </mc:AlternateContent>
+  <p:timing>
+    <p:tnLst>
+      <p:par>
+        <p:cTn id="1" dur="indefinite" restart="never" nodeType="tmRoot"/>
+      </p:par>
+    </p:tnLst>
+  </p:timing>
+</p:sld>
+</file>
+
+<file path=ppt/slides/slide14.xml><?xml version="1.0" encoding="utf-8"?>
+<p:sld xmlns:a="http://schemas.openxmlformats.org/drawingml/2006/main" xmlns:r="http://schemas.openxmlformats.org/officeDocument/2006/relationships" xmlns:p="http://schemas.openxmlformats.org/presentationml/2006/main" show="0">
+  <p:cSld>
+    <p:spTree>
+      <p:nvGrpSpPr>
+        <p:cNvPr id="1" name=""/>
+        <p:cNvGrpSpPr/>
+        <p:nvPr/>
+      </p:nvGrpSpPr>
+      <p:grpSpPr>
+        <a:xfrm>
+          <a:off x="0" y="0"/>
+          <a:ext cx="0" cy="0"/>
+          <a:chOff x="0" y="0"/>
+          <a:chExt cx="0" cy="0"/>
+        </a:xfrm>
+      </p:grpSpPr>
+      <p:sp>
+        <p:nvSpPr>
+          <p:cNvPr id="2" name="Titre 1"/>
+          <p:cNvSpPr>
+            <a:spLocks noGrp="1"/>
+          </p:cNvSpPr>
+          <p:nvPr>
+            <p:ph type="title"/>
+          </p:nvPr>
+        </p:nvSpPr>
+        <p:spPr/>
+        <p:txBody>
+          <a:bodyPr/>
+          <a:lstStyle/>
+          <a:p>
+            <a:r>
               <a:rPr lang="fr-FR" dirty="0"/>
               <a:t>Questionnaire post-expérimental (détail</a:t>
             </a:r>
@@ -10257,7 +10414,7 @@
           <a:p>
             <a:fld id="{F60449C3-8BCD-4455-8E2A-A866209B9601}" type="slidenum">
               <a:rPr lang="fr-CH" smtClean="0"/>
-              <a:t>13</a:t>
+              <a:t>14</a:t>
             </a:fld>
             <a:endParaRPr lang="fr-CH"/>
           </a:p>
@@ -10291,7 +10448,7 @@
 </p:sld>
 </file>
 
-<file path=ppt/slides/slide14.xml><?xml version="1.0" encoding="utf-8"?>
+<file path=ppt/slides/slide15.xml><?xml version="1.0" encoding="utf-8"?>
 <p:sld xmlns:a="http://schemas.openxmlformats.org/drawingml/2006/main" xmlns:r="http://schemas.openxmlformats.org/officeDocument/2006/relationships" xmlns:p="http://schemas.openxmlformats.org/presentationml/2006/main">
   <p:cSld>
     <p:spTree>
@@ -10324,6 +10481,107 @@
           <a:lstStyle/>
           <a:p>
             <a:r>
+              <a:rPr lang="fr-CH" dirty="0" smtClean="0"/>
+              <a:t>Lien du projet</a:t>
+            </a:r>
+            <a:endParaRPr lang="fr-CH" dirty="0"/>
+          </a:p>
+        </p:txBody>
+      </p:sp>
+      <p:sp>
+        <p:nvSpPr>
+          <p:cNvPr id="3" name="Espace réservé du contenu 2"/>
+          <p:cNvSpPr>
+            <a:spLocks noGrp="1"/>
+          </p:cNvSpPr>
+          <p:nvPr>
+            <p:ph idx="1"/>
+          </p:nvPr>
+        </p:nvSpPr>
+        <p:spPr/>
+        <p:txBody>
+          <a:bodyPr/>
+          <a:lstStyle/>
+          <a:p>
+            <a:pPr marL="0" indent="0">
+              <a:buNone/>
+            </a:pPr>
+            <a:r>
+              <a:rPr lang="fr-CH" dirty="0"/>
+              <a:t>https://github.com/LunarX/ProjectTime</a:t>
+            </a:r>
+          </a:p>
+        </p:txBody>
+      </p:sp>
+      <p:sp>
+        <p:nvSpPr>
+          <p:cNvPr id="4" name="Espace réservé du numéro de diapositive 3"/>
+          <p:cNvSpPr>
+            <a:spLocks noGrp="1"/>
+          </p:cNvSpPr>
+          <p:nvPr>
+            <p:ph type="sldNum" sz="quarter" idx="12"/>
+          </p:nvPr>
+        </p:nvSpPr>
+        <p:spPr/>
+        <p:txBody>
+          <a:bodyPr/>
+          <a:lstStyle/>
+          <a:p>
+            <a:fld id="{F60449C3-8BCD-4455-8E2A-A866209B9601}" type="slidenum">
+              <a:rPr lang="fr-CH" smtClean="0"/>
+              <a:t>15</a:t>
+            </a:fld>
+            <a:endParaRPr lang="fr-CH"/>
+          </a:p>
+        </p:txBody>
+      </p:sp>
+    </p:spTree>
+    <p:extLst>
+      <p:ext uri="{BB962C8B-B14F-4D97-AF65-F5344CB8AC3E}">
+        <p14:creationId xmlns:p14="http://schemas.microsoft.com/office/powerpoint/2010/main" val="1905998084"/>
+      </p:ext>
+    </p:extLst>
+  </p:cSld>
+  <p:clrMapOvr>
+    <a:masterClrMapping/>
+  </p:clrMapOvr>
+</p:sld>
+</file>
+
+<file path=ppt/slides/slide16.xml><?xml version="1.0" encoding="utf-8"?>
+<p:sld xmlns:a="http://schemas.openxmlformats.org/drawingml/2006/main" xmlns:r="http://schemas.openxmlformats.org/officeDocument/2006/relationships" xmlns:p="http://schemas.openxmlformats.org/presentationml/2006/main">
+  <p:cSld>
+    <p:spTree>
+      <p:nvGrpSpPr>
+        <p:cNvPr id="1" name=""/>
+        <p:cNvGrpSpPr/>
+        <p:nvPr/>
+      </p:nvGrpSpPr>
+      <p:grpSpPr>
+        <a:xfrm>
+          <a:off x="0" y="0"/>
+          <a:ext cx="0" cy="0"/>
+          <a:chOff x="0" y="0"/>
+          <a:chExt cx="0" cy="0"/>
+        </a:xfrm>
+      </p:grpSpPr>
+      <p:sp>
+        <p:nvSpPr>
+          <p:cNvPr id="2" name="Titre 1"/>
+          <p:cNvSpPr>
+            <a:spLocks noGrp="1"/>
+          </p:cNvSpPr>
+          <p:nvPr>
+            <p:ph type="title"/>
+          </p:nvPr>
+        </p:nvSpPr>
+        <p:spPr/>
+        <p:txBody>
+          <a:bodyPr/>
+          <a:lstStyle/>
+          <a:p>
+            <a:r>
               <a:rPr lang="fr-CH" dirty="0"/>
               <a:t>Merci pour votre attention</a:t>
             </a:r>
@@ -10366,7 +10624,7 @@
           <a:p>
             <a:fld id="{5C659214-C5B2-4878-BE63-6680446A108B}" type="slidenum">
               <a:rPr lang="fr-CH" smtClean="0"/>
-              <a:t>14</a:t>
+              <a:t>16</a:t>
             </a:fld>
             <a:endParaRPr lang="fr-CH"/>
           </a:p>
@@ -10535,7 +10793,6 @@
               <a:rPr lang="fr-CH" dirty="0"/>
               <a:t>Hypothèse</a:t>
             </a:r>
-            <a:endParaRPr lang="fr-CH" dirty="0"/>
           </a:p>
         </p:txBody>
       </p:sp>
@@ -10600,6 +10857,200 @@
               <a:rPr lang="fr-FR" sz="1600" dirty="0" smtClean="0"/>
               <a:t>Les indicateurs visuels/auditifs augmentent le niveau de stresse du joueur</a:t>
             </a:r>
+          </a:p>
+        </p:txBody>
+      </p:sp>
+      <p:sp>
+        <p:nvSpPr>
+          <p:cNvPr id="5" name="Espace réservé du contenu 2"/>
+          <p:cNvSpPr txBox="1">
+            <a:spLocks/>
+          </p:cNvSpPr>
+          <p:nvPr/>
+        </p:nvSpPr>
+        <p:spPr>
+          <a:xfrm>
+            <a:off x="677334" y="4271968"/>
+            <a:ext cx="8596668" cy="1219494"/>
+          </a:xfrm>
+          <a:prstGeom prst="rect">
+            <a:avLst/>
+          </a:prstGeom>
+        </p:spPr>
+        <p:txBody>
+          <a:bodyPr vert="horz" lIns="91440" tIns="45720" rIns="91440" bIns="45720" rtlCol="0">
+            <a:normAutofit/>
+          </a:bodyPr>
+          <a:lstStyle>
+            <a:lvl1pPr marL="228600" indent="-228600" algn="l" defTabSz="914400" rtl="0" eaLnBrk="1" latinLnBrk="0" hangingPunct="1">
+              <a:lnSpc>
+                <a:spcPct val="90000"/>
+              </a:lnSpc>
+              <a:spcBef>
+                <a:spcPts val="1000"/>
+              </a:spcBef>
+              <a:buFont typeface="Arial" panose="020B0604020202020204" pitchFamily="34" charset="0"/>
+              <a:buChar char="•"/>
+              <a:defRPr sz="2400" kern="1200">
+                <a:solidFill>
+                  <a:schemeClr val="tx1"/>
+                </a:solidFill>
+                <a:latin typeface="Trebuchet MS" panose="020B0603020202020204" pitchFamily="34" charset="0"/>
+                <a:ea typeface="+mn-ea"/>
+                <a:cs typeface="+mn-cs"/>
+              </a:defRPr>
+            </a:lvl1pPr>
+            <a:lvl2pPr marL="685800" indent="-228600" algn="l" defTabSz="914400" rtl="0" eaLnBrk="1" latinLnBrk="0" hangingPunct="1">
+              <a:lnSpc>
+                <a:spcPct val="90000"/>
+              </a:lnSpc>
+              <a:spcBef>
+                <a:spcPts val="500"/>
+              </a:spcBef>
+              <a:buFont typeface="Arial" panose="020B0604020202020204" pitchFamily="34" charset="0"/>
+              <a:buChar char="•"/>
+              <a:defRPr sz="2000" kern="1200">
+                <a:solidFill>
+                  <a:schemeClr val="tx1"/>
+                </a:solidFill>
+                <a:latin typeface="Trebuchet MS" panose="020B0603020202020204" pitchFamily="34" charset="0"/>
+                <a:ea typeface="+mn-ea"/>
+                <a:cs typeface="+mn-cs"/>
+              </a:defRPr>
+            </a:lvl2pPr>
+            <a:lvl3pPr marL="1143000" indent="-228600" algn="l" defTabSz="914400" rtl="0" eaLnBrk="1" latinLnBrk="0" hangingPunct="1">
+              <a:lnSpc>
+                <a:spcPct val="90000"/>
+              </a:lnSpc>
+              <a:spcBef>
+                <a:spcPts val="500"/>
+              </a:spcBef>
+              <a:buFont typeface="Arial" panose="020B0604020202020204" pitchFamily="34" charset="0"/>
+              <a:buChar char="•"/>
+              <a:defRPr sz="1800" kern="1200">
+                <a:solidFill>
+                  <a:schemeClr val="tx1"/>
+                </a:solidFill>
+                <a:latin typeface="Trebuchet MS" panose="020B0603020202020204" pitchFamily="34" charset="0"/>
+                <a:ea typeface="+mn-ea"/>
+                <a:cs typeface="+mn-cs"/>
+              </a:defRPr>
+            </a:lvl3pPr>
+            <a:lvl4pPr marL="1600200" indent="-228600" algn="l" defTabSz="914400" rtl="0" eaLnBrk="1" latinLnBrk="0" hangingPunct="1">
+              <a:lnSpc>
+                <a:spcPct val="90000"/>
+              </a:lnSpc>
+              <a:spcBef>
+                <a:spcPts val="500"/>
+              </a:spcBef>
+              <a:buFont typeface="Arial" panose="020B0604020202020204" pitchFamily="34" charset="0"/>
+              <a:buChar char="•"/>
+              <a:defRPr sz="1600" kern="1200">
+                <a:solidFill>
+                  <a:schemeClr val="tx1"/>
+                </a:solidFill>
+                <a:latin typeface="Trebuchet MS" panose="020B0603020202020204" pitchFamily="34" charset="0"/>
+                <a:ea typeface="+mn-ea"/>
+                <a:cs typeface="+mn-cs"/>
+              </a:defRPr>
+            </a:lvl4pPr>
+            <a:lvl5pPr marL="2057400" indent="-228600" algn="l" defTabSz="914400" rtl="0" eaLnBrk="1" latinLnBrk="0" hangingPunct="1">
+              <a:lnSpc>
+                <a:spcPct val="90000"/>
+              </a:lnSpc>
+              <a:spcBef>
+                <a:spcPts val="500"/>
+              </a:spcBef>
+              <a:buFont typeface="Arial" panose="020B0604020202020204" pitchFamily="34" charset="0"/>
+              <a:buChar char="•"/>
+              <a:defRPr sz="1600" kern="1200">
+                <a:solidFill>
+                  <a:schemeClr val="tx1"/>
+                </a:solidFill>
+                <a:latin typeface="Trebuchet MS" panose="020B0603020202020204" pitchFamily="34" charset="0"/>
+                <a:ea typeface="+mn-ea"/>
+                <a:cs typeface="+mn-cs"/>
+              </a:defRPr>
+            </a:lvl5pPr>
+            <a:lvl6pPr marL="2514600" indent="-228600" algn="l" defTabSz="914400" rtl="0" eaLnBrk="1" latinLnBrk="0" hangingPunct="1">
+              <a:lnSpc>
+                <a:spcPct val="90000"/>
+              </a:lnSpc>
+              <a:spcBef>
+                <a:spcPts val="500"/>
+              </a:spcBef>
+              <a:buFont typeface="Arial" panose="020B0604020202020204" pitchFamily="34" charset="0"/>
+              <a:buChar char="•"/>
+              <a:defRPr sz="1800" kern="1200">
+                <a:solidFill>
+                  <a:schemeClr val="tx1"/>
+                </a:solidFill>
+                <a:latin typeface="+mn-lt"/>
+                <a:ea typeface="+mn-ea"/>
+                <a:cs typeface="+mn-cs"/>
+              </a:defRPr>
+            </a:lvl6pPr>
+            <a:lvl7pPr marL="2971800" indent="-228600" algn="l" defTabSz="914400" rtl="0" eaLnBrk="1" latinLnBrk="0" hangingPunct="1">
+              <a:lnSpc>
+                <a:spcPct val="90000"/>
+              </a:lnSpc>
+              <a:spcBef>
+                <a:spcPts val="500"/>
+              </a:spcBef>
+              <a:buFont typeface="Arial" panose="020B0604020202020204" pitchFamily="34" charset="0"/>
+              <a:buChar char="•"/>
+              <a:defRPr sz="1800" kern="1200">
+                <a:solidFill>
+                  <a:schemeClr val="tx1"/>
+                </a:solidFill>
+                <a:latin typeface="+mn-lt"/>
+                <a:ea typeface="+mn-ea"/>
+                <a:cs typeface="+mn-cs"/>
+              </a:defRPr>
+            </a:lvl7pPr>
+            <a:lvl8pPr marL="3429000" indent="-228600" algn="l" defTabSz="914400" rtl="0" eaLnBrk="1" latinLnBrk="0" hangingPunct="1">
+              <a:lnSpc>
+                <a:spcPct val="90000"/>
+              </a:lnSpc>
+              <a:spcBef>
+                <a:spcPts val="500"/>
+              </a:spcBef>
+              <a:buFont typeface="Arial" panose="020B0604020202020204" pitchFamily="34" charset="0"/>
+              <a:buChar char="•"/>
+              <a:defRPr sz="1800" kern="1200">
+                <a:solidFill>
+                  <a:schemeClr val="tx1"/>
+                </a:solidFill>
+                <a:latin typeface="+mn-lt"/>
+                <a:ea typeface="+mn-ea"/>
+                <a:cs typeface="+mn-cs"/>
+              </a:defRPr>
+            </a:lvl8pPr>
+            <a:lvl9pPr marL="3886200" indent="-228600" algn="l" defTabSz="914400" rtl="0" eaLnBrk="1" latinLnBrk="0" hangingPunct="1">
+              <a:lnSpc>
+                <a:spcPct val="90000"/>
+              </a:lnSpc>
+              <a:spcBef>
+                <a:spcPts val="500"/>
+              </a:spcBef>
+              <a:buFont typeface="Arial" panose="020B0604020202020204" pitchFamily="34" charset="0"/>
+              <a:buChar char="•"/>
+              <a:defRPr sz="1800" kern="1200">
+                <a:solidFill>
+                  <a:schemeClr val="tx1"/>
+                </a:solidFill>
+                <a:latin typeface="+mn-lt"/>
+                <a:ea typeface="+mn-ea"/>
+                <a:cs typeface="+mn-cs"/>
+              </a:defRPr>
+            </a:lvl9pPr>
+          </a:lstStyle>
+          <a:p>
+            <a:r>
+              <a:rPr lang="fr-FR" sz="1600" dirty="0" smtClean="0"/>
+              <a:t>4 tâches</a:t>
+            </a:r>
+            <a:endParaRPr lang="fr-FR" sz="1600" dirty="0" smtClean="0"/>
           </a:p>
         </p:txBody>
       </p:sp>
@@ -10613,11 +11064,11 @@
   <p:clrMapOvr>
     <a:masterClrMapping/>
   </p:clrMapOvr>
-  <mc:AlternateContent xmlns:mc="http://schemas.openxmlformats.org/markup-compatibility/2006">
-    <mc:Choice xmlns:p14="http://schemas.microsoft.com/office/powerpoint/2010/main" Requires="p14">
+  <mc:AlternateContent xmlns:mc="http://schemas.openxmlformats.org/markup-compatibility/2006" xmlns:p14="http://schemas.microsoft.com/office/powerpoint/2010/main">
+    <mc:Choice Requires="p14">
       <p:transition spd="slow" p14:dur="2000"/>
     </mc:Choice>
-    <mc:Fallback>
+    <mc:Fallback xmlns="">
       <p:transition spd="slow"/>
     </mc:Fallback>
   </mc:AlternateContent>
@@ -10861,9 +11312,10 @@
           <a:lstStyle/>
           <a:p>
             <a:r>
-              <a:rPr lang="fr-CH" dirty="0"/>
-              <a:t>Mesure du BPM</a:t>
-            </a:r>
+              <a:rPr lang="fr-CH" dirty="0" smtClean="0"/>
+              <a:t>Résultats</a:t>
+            </a:r>
+            <a:endParaRPr lang="fr-CH" dirty="0"/>
           </a:p>
         </p:txBody>
       </p:sp>
@@ -10885,6 +11337,317 @@
             <a:fld id="{F60449C3-8BCD-4455-8E2A-A866209B9601}" type="slidenum">
               <a:rPr lang="fr-CH" smtClean="0"/>
               <a:t>5</a:t>
+            </a:fld>
+            <a:endParaRPr lang="fr-CH"/>
+          </a:p>
+        </p:txBody>
+      </p:sp>
+      <p:pic>
+        <p:nvPicPr>
+          <p:cNvPr id="6" name="Image 5"/>
+          <p:cNvPicPr>
+            <a:picLocks noChangeAspect="1"/>
+          </p:cNvPicPr>
+          <p:nvPr/>
+        </p:nvPicPr>
+        <p:blipFill>
+          <a:blip r:embed="rId2"/>
+          <a:stretch>
+            <a:fillRect/>
+          </a:stretch>
+        </p:blipFill>
+        <p:spPr>
+          <a:xfrm>
+            <a:off x="1102622" y="2926081"/>
+            <a:ext cx="984812" cy="980122"/>
+          </a:xfrm>
+          <a:prstGeom prst="rect">
+            <a:avLst/>
+          </a:prstGeom>
+        </p:spPr>
+      </p:pic>
+      <p:sp>
+        <p:nvSpPr>
+          <p:cNvPr id="7" name="ZoneTexte 6"/>
+          <p:cNvSpPr txBox="1"/>
+          <p:nvPr/>
+        </p:nvSpPr>
+        <p:spPr>
+          <a:xfrm>
+            <a:off x="888232" y="4103522"/>
+            <a:ext cx="1413592" cy="369332"/>
+          </a:xfrm>
+          <a:prstGeom prst="rect">
+            <a:avLst/>
+          </a:prstGeom>
+          <a:noFill/>
+        </p:spPr>
+        <p:txBody>
+          <a:bodyPr wrap="none" rtlCol="0">
+            <a:spAutoFit/>
+          </a:bodyPr>
+          <a:lstStyle/>
+          <a:p>
+            <a:r>
+              <a:rPr lang="fr-CH" dirty="0" smtClean="0"/>
+              <a:t>9 Utilisateurs</a:t>
+            </a:r>
+            <a:endParaRPr lang="fr-CH" dirty="0"/>
+          </a:p>
+        </p:txBody>
+      </p:sp>
+      <p:sp>
+        <p:nvSpPr>
+          <p:cNvPr id="8" name="ZoneTexte 7"/>
+          <p:cNvSpPr txBox="1"/>
+          <p:nvPr/>
+        </p:nvSpPr>
+        <p:spPr>
+          <a:xfrm>
+            <a:off x="3500846" y="3231476"/>
+            <a:ext cx="1249060" cy="369332"/>
+          </a:xfrm>
+          <a:prstGeom prst="rect">
+            <a:avLst/>
+          </a:prstGeom>
+          <a:noFill/>
+        </p:spPr>
+        <p:txBody>
+          <a:bodyPr wrap="none" rtlCol="0">
+            <a:spAutoFit/>
+          </a:bodyPr>
+          <a:lstStyle/>
+          <a:p>
+            <a:r>
+              <a:rPr lang="fr-CH" b="1" dirty="0" smtClean="0"/>
+              <a:t>21 ~ 27 ans</a:t>
+            </a:r>
+            <a:endParaRPr lang="fr-CH" b="1" dirty="0"/>
+          </a:p>
+        </p:txBody>
+      </p:sp>
+      <p:pic>
+        <p:nvPicPr>
+          <p:cNvPr id="10" name="Image 9"/>
+          <p:cNvPicPr>
+            <a:picLocks noChangeAspect="1"/>
+          </p:cNvPicPr>
+          <p:nvPr/>
+        </p:nvPicPr>
+        <p:blipFill>
+          <a:blip r:embed="rId3"/>
+          <a:stretch>
+            <a:fillRect/>
+          </a:stretch>
+        </p:blipFill>
+        <p:spPr>
+          <a:xfrm>
+            <a:off x="6564386" y="2850938"/>
+            <a:ext cx="1507753" cy="986311"/>
+          </a:xfrm>
+          <a:prstGeom prst="rect">
+            <a:avLst/>
+          </a:prstGeom>
+        </p:spPr>
+      </p:pic>
+      <p:sp>
+        <p:nvSpPr>
+          <p:cNvPr id="11" name="ZoneTexte 10"/>
+          <p:cNvSpPr txBox="1"/>
+          <p:nvPr/>
+        </p:nvSpPr>
+        <p:spPr>
+          <a:xfrm>
+            <a:off x="6046921" y="4103523"/>
+            <a:ext cx="2542684" cy="369332"/>
+          </a:xfrm>
+          <a:prstGeom prst="rect">
+            <a:avLst/>
+          </a:prstGeom>
+          <a:noFill/>
+        </p:spPr>
+        <p:txBody>
+          <a:bodyPr wrap="none" rtlCol="0">
+            <a:spAutoFit/>
+          </a:bodyPr>
+          <a:lstStyle/>
+          <a:p>
+            <a:r>
+              <a:rPr lang="fr-CH" dirty="0" smtClean="0"/>
+              <a:t>Familier avec ordinateurs</a:t>
+            </a:r>
+            <a:endParaRPr lang="fr-CH" dirty="0"/>
+          </a:p>
+        </p:txBody>
+      </p:sp>
+      <p:pic>
+        <p:nvPicPr>
+          <p:cNvPr id="12" name="Image 11"/>
+          <p:cNvPicPr>
+            <a:picLocks noChangeAspect="1"/>
+          </p:cNvPicPr>
+          <p:nvPr/>
+        </p:nvPicPr>
+        <p:blipFill>
+          <a:blip r:embed="rId4">
+            <a:extLst>
+              <a:ext uri="{28A0092B-C50C-407E-A947-70E740481C1C}">
+                <a14:useLocalDpi xmlns:a14="http://schemas.microsoft.com/office/drawing/2010/main" val="0"/>
+              </a:ext>
+            </a:extLst>
+          </a:blip>
+          <a:stretch>
+            <a:fillRect/>
+          </a:stretch>
+        </p:blipFill>
+        <p:spPr>
+          <a:xfrm>
+            <a:off x="9806471" y="2850938"/>
+            <a:ext cx="938817" cy="938817"/>
+          </a:xfrm>
+          <a:prstGeom prst="rect">
+            <a:avLst/>
+          </a:prstGeom>
+        </p:spPr>
+      </p:pic>
+      <p:sp>
+        <p:nvSpPr>
+          <p:cNvPr id="13" name="ZoneTexte 12"/>
+          <p:cNvSpPr txBox="1"/>
+          <p:nvPr/>
+        </p:nvSpPr>
+        <p:spPr>
+          <a:xfrm>
+            <a:off x="9274002" y="3965023"/>
+            <a:ext cx="1991090" cy="646331"/>
+          </a:xfrm>
+          <a:prstGeom prst="rect">
+            <a:avLst/>
+          </a:prstGeom>
+          <a:noFill/>
+        </p:spPr>
+        <p:txBody>
+          <a:bodyPr wrap="square" rtlCol="0">
+            <a:spAutoFit/>
+          </a:bodyPr>
+          <a:lstStyle/>
+          <a:p>
+            <a:pPr algn="ctr"/>
+            <a:r>
+              <a:rPr lang="fr-CH" dirty="0" smtClean="0"/>
+              <a:t>Pas familier avec jeu de rythme</a:t>
+            </a:r>
+            <a:endParaRPr lang="fr-CH" dirty="0"/>
+          </a:p>
+        </p:txBody>
+      </p:sp>
+      <p:sp>
+        <p:nvSpPr>
+          <p:cNvPr id="14" name="ZoneTexte 13"/>
+          <p:cNvSpPr txBox="1"/>
+          <p:nvPr/>
+        </p:nvSpPr>
+        <p:spPr>
+          <a:xfrm>
+            <a:off x="3841316" y="4079183"/>
+            <a:ext cx="540212" cy="369332"/>
+          </a:xfrm>
+          <a:prstGeom prst="rect">
+            <a:avLst/>
+          </a:prstGeom>
+          <a:noFill/>
+        </p:spPr>
+        <p:txBody>
+          <a:bodyPr wrap="none" rtlCol="0">
+            <a:spAutoFit/>
+          </a:bodyPr>
+          <a:lstStyle/>
+          <a:p>
+            <a:r>
+              <a:rPr lang="fr-CH" dirty="0" smtClean="0"/>
+              <a:t>Âge</a:t>
+            </a:r>
+            <a:endParaRPr lang="fr-CH" dirty="0"/>
+          </a:p>
+        </p:txBody>
+      </p:sp>
+    </p:spTree>
+    <p:extLst>
+      <p:ext uri="{BB962C8B-B14F-4D97-AF65-F5344CB8AC3E}">
+        <p14:creationId xmlns:p14="http://schemas.microsoft.com/office/powerpoint/2010/main" val="2677862315"/>
+      </p:ext>
+    </p:extLst>
+  </p:cSld>
+  <p:clrMapOvr>
+    <a:masterClrMapping/>
+  </p:clrMapOvr>
+  <p:timing>
+    <p:tnLst>
+      <p:par>
+        <p:cTn id="1" dur="indefinite" restart="never" nodeType="tmRoot"/>
+      </p:par>
+    </p:tnLst>
+  </p:timing>
+</p:sld>
+</file>
+
+<file path=ppt/slides/slide6.xml><?xml version="1.0" encoding="utf-8"?>
+<p:sld xmlns:a="http://schemas.openxmlformats.org/drawingml/2006/main" xmlns:r="http://schemas.openxmlformats.org/officeDocument/2006/relationships" xmlns:p="http://schemas.openxmlformats.org/presentationml/2006/main">
+  <p:cSld>
+    <p:spTree>
+      <p:nvGrpSpPr>
+        <p:cNvPr id="1" name=""/>
+        <p:cNvGrpSpPr/>
+        <p:nvPr/>
+      </p:nvGrpSpPr>
+      <p:grpSpPr>
+        <a:xfrm>
+          <a:off x="0" y="0"/>
+          <a:ext cx="0" cy="0"/>
+          <a:chOff x="0" y="0"/>
+          <a:chExt cx="0" cy="0"/>
+        </a:xfrm>
+      </p:grpSpPr>
+      <p:sp>
+        <p:nvSpPr>
+          <p:cNvPr id="2" name="Titre 1"/>
+          <p:cNvSpPr>
+            <a:spLocks noGrp="1"/>
+          </p:cNvSpPr>
+          <p:nvPr>
+            <p:ph type="title"/>
+          </p:nvPr>
+        </p:nvSpPr>
+        <p:spPr/>
+        <p:txBody>
+          <a:bodyPr/>
+          <a:lstStyle/>
+          <a:p>
+            <a:r>
+              <a:rPr lang="fr-CH" dirty="0"/>
+              <a:t>Mesure du BPM</a:t>
+            </a:r>
+          </a:p>
+        </p:txBody>
+      </p:sp>
+      <p:sp>
+        <p:nvSpPr>
+          <p:cNvPr id="4" name="Espace réservé du numéro de diapositive 3"/>
+          <p:cNvSpPr>
+            <a:spLocks noGrp="1"/>
+          </p:cNvSpPr>
+          <p:nvPr>
+            <p:ph type="sldNum" sz="quarter" idx="12"/>
+          </p:nvPr>
+        </p:nvSpPr>
+        <p:spPr/>
+        <p:txBody>
+          <a:bodyPr/>
+          <a:lstStyle/>
+          <a:p>
+            <a:fld id="{F60449C3-8BCD-4455-8E2A-A866209B9601}" type="slidenum">
+              <a:rPr lang="fr-CH" smtClean="0"/>
+              <a:t>6</a:t>
             </a:fld>
             <a:endParaRPr lang="fr-CH"/>
           </a:p>
@@ -12164,10 +12927,17 @@
   <p:clrMapOvr>
     <a:masterClrMapping/>
   </p:clrMapOvr>
+  <p:timing>
+    <p:tnLst>
+      <p:par>
+        <p:cTn id="1" dur="indefinite" restart="never" nodeType="tmRoot"/>
+      </p:par>
+    </p:tnLst>
+  </p:timing>
 </p:sld>
 </file>
 
-<file path=ppt/slides/slide6.xml><?xml version="1.0" encoding="utf-8"?>
+<file path=ppt/slides/slide7.xml><?xml version="1.0" encoding="utf-8"?>
 <p:sld xmlns:a="http://schemas.openxmlformats.org/drawingml/2006/main" xmlns:r="http://schemas.openxmlformats.org/officeDocument/2006/relationships" xmlns:p="http://schemas.openxmlformats.org/presentationml/2006/main">
   <p:cSld>
     <p:spTree>
@@ -12224,7 +12994,7 @@
           <a:p>
             <a:fld id="{F60449C3-8BCD-4455-8E2A-A866209B9601}" type="slidenum">
               <a:rPr lang="fr-CH" smtClean="0"/>
-              <a:t>6</a:t>
+              <a:t>7</a:t>
             </a:fld>
             <a:endParaRPr lang="fr-CH"/>
           </a:p>
@@ -12332,7 +13102,7 @@
 </p:sld>
 </file>
 
-<file path=ppt/slides/slide7.xml><?xml version="1.0" encoding="utf-8"?>
+<file path=ppt/slides/slide8.xml><?xml version="1.0" encoding="utf-8"?>
 <p:sld xmlns:a="http://schemas.openxmlformats.org/drawingml/2006/main" xmlns:r="http://schemas.openxmlformats.org/officeDocument/2006/relationships" xmlns:p="http://schemas.openxmlformats.org/presentationml/2006/main">
   <p:cSld>
     <p:spTree>
@@ -12389,7 +13159,7 @@
           <a:p>
             <a:fld id="{F60449C3-8BCD-4455-8E2A-A866209B9601}" type="slidenum">
               <a:rPr lang="fr-CH" smtClean="0"/>
-              <a:t>7</a:t>
+              <a:t>8</a:t>
             </a:fld>
             <a:endParaRPr lang="fr-CH"/>
           </a:p>
@@ -12538,7 +13308,7 @@
 </p:sld>
 </file>
 
-<file path=ppt/slides/slide8.xml><?xml version="1.0" encoding="utf-8"?>
+<file path=ppt/slides/slide9.xml><?xml version="1.0" encoding="utf-8"?>
 <p:sld xmlns:a="http://schemas.openxmlformats.org/drawingml/2006/main" xmlns:r="http://schemas.openxmlformats.org/officeDocument/2006/relationships" xmlns:p="http://schemas.openxmlformats.org/presentationml/2006/main">
   <p:cSld>
     <p:spTree>
@@ -12595,7 +13365,7 @@
           <a:p>
             <a:fld id="{F60449C3-8BCD-4455-8E2A-A866209B9601}" type="slidenum">
               <a:rPr lang="fr-CH" smtClean="0"/>
-              <a:t>8</a:t>
+              <a:t>9</a:t>
             </a:fld>
             <a:endParaRPr lang="fr-CH"/>
           </a:p>
@@ -12641,15 +13411,7 @@
             </a:pPr>
             <a:r>
               <a:rPr lang="fr-FR" sz="1600" dirty="0" smtClean="0"/>
-              <a:t>Les hexagones augmentent le niveau de </a:t>
-            </a:r>
-            <a:r>
-              <a:rPr lang="fr-FR" sz="1600" dirty="0" smtClean="0"/>
-              <a:t>stress </a:t>
-            </a:r>
-            <a:r>
-              <a:rPr lang="fr-FR" sz="1600" dirty="0" smtClean="0"/>
-              <a:t>du joueur</a:t>
+              <a:t>Les hexagones augmentent le niveau de stress du joueur</a:t>
             </a:r>
           </a:p>
           <a:p>
@@ -12660,15 +13422,7 @@
             </a:pPr>
             <a:r>
               <a:rPr lang="fr-FR" sz="1600" dirty="0" smtClean="0"/>
-              <a:t>Les indicateurs visuels/auditifs augmentent le niveau de </a:t>
-            </a:r>
-            <a:r>
-              <a:rPr lang="fr-FR" sz="1600" dirty="0" smtClean="0"/>
-              <a:t>stress </a:t>
-            </a:r>
-            <a:r>
-              <a:rPr lang="fr-FR" sz="1600" dirty="0" smtClean="0"/>
-              <a:t>du joueur</a:t>
+              <a:t>Les indicateurs visuels/auditifs augmentent le niveau de stress du joueur</a:t>
             </a:r>
           </a:p>
         </p:txBody>
@@ -12771,161 +13525,6 @@
   <p:clrMapOvr>
     <a:masterClrMapping/>
   </p:clrMapOvr>
-  <p:timing>
-    <p:tnLst>
-      <p:par>
-        <p:cTn id="1" dur="indefinite" restart="never" nodeType="tmRoot"/>
-      </p:par>
-    </p:tnLst>
-  </p:timing>
-</p:sld>
-</file>
-
-<file path=ppt/slides/slide9.xml><?xml version="1.0" encoding="utf-8"?>
-<p:sld xmlns:a="http://schemas.openxmlformats.org/drawingml/2006/main" xmlns:r="http://schemas.openxmlformats.org/officeDocument/2006/relationships" xmlns:p="http://schemas.openxmlformats.org/presentationml/2006/main" show="0">
-  <p:cSld>
-    <p:spTree>
-      <p:nvGrpSpPr>
-        <p:cNvPr id="1" name=""/>
-        <p:cNvGrpSpPr/>
-        <p:nvPr/>
-      </p:nvGrpSpPr>
-      <p:grpSpPr>
-        <a:xfrm>
-          <a:off x="0" y="0"/>
-          <a:ext cx="0" cy="0"/>
-          <a:chOff x="0" y="0"/>
-          <a:chExt cx="0" cy="0"/>
-        </a:xfrm>
-      </p:grpSpPr>
-      <p:sp>
-        <p:nvSpPr>
-          <p:cNvPr id="2" name="Titre 1"/>
-          <p:cNvSpPr>
-            <a:spLocks noGrp="1"/>
-          </p:cNvSpPr>
-          <p:nvPr>
-            <p:ph type="title"/>
-          </p:nvPr>
-        </p:nvSpPr>
-        <p:spPr/>
-        <p:txBody>
-          <a:bodyPr/>
-          <a:lstStyle/>
-          <a:p>
-            <a:r>
-              <a:rPr lang="fr-CH" dirty="0"/>
-              <a:t>Mode d’évaluation prévu</a:t>
-            </a:r>
-          </a:p>
-        </p:txBody>
-      </p:sp>
-      <p:sp>
-        <p:nvSpPr>
-          <p:cNvPr id="4" name="Espace réservé du numéro de diapositive 3"/>
-          <p:cNvSpPr>
-            <a:spLocks noGrp="1"/>
-          </p:cNvSpPr>
-          <p:nvPr>
-            <p:ph type="sldNum" sz="quarter" idx="12"/>
-          </p:nvPr>
-        </p:nvSpPr>
-        <p:spPr/>
-        <p:txBody>
-          <a:bodyPr/>
-          <a:lstStyle/>
-          <a:p>
-            <a:fld id="{F60449C3-8BCD-4455-8E2A-A866209B9601}" type="slidenum">
-              <a:rPr lang="fr-CH" smtClean="0"/>
-              <a:t>9</a:t>
-            </a:fld>
-            <a:endParaRPr lang="fr-CH"/>
-          </a:p>
-        </p:txBody>
-      </p:sp>
-      <p:sp>
-        <p:nvSpPr>
-          <p:cNvPr id="5" name="ZoneTexte 4"/>
-          <p:cNvSpPr txBox="1"/>
-          <p:nvPr/>
-        </p:nvSpPr>
-        <p:spPr>
-          <a:xfrm>
-            <a:off x="743237" y="2799654"/>
-            <a:ext cx="3319370" cy="523220"/>
-          </a:xfrm>
-          <a:prstGeom prst="rect">
-            <a:avLst/>
-          </a:prstGeom>
-          <a:noFill/>
-        </p:spPr>
-        <p:txBody>
-          <a:bodyPr wrap="none" rtlCol="0">
-            <a:spAutoFit/>
-          </a:bodyPr>
-          <a:lstStyle/>
-          <a:p>
-            <a:r>
-              <a:rPr lang="fr-CH" sz="2800" dirty="0"/>
-              <a:t>Questionnaire initiale</a:t>
-            </a:r>
-          </a:p>
-        </p:txBody>
-      </p:sp>
-      <p:sp>
-        <p:nvSpPr>
-          <p:cNvPr id="6" name="Espace réservé du contenu 2"/>
-          <p:cNvSpPr>
-            <a:spLocks noGrp="1"/>
-          </p:cNvSpPr>
-          <p:nvPr>
-            <p:ph idx="1"/>
-          </p:nvPr>
-        </p:nvSpPr>
-        <p:spPr>
-          <a:xfrm>
-            <a:off x="743237" y="3710223"/>
-            <a:ext cx="3319370" cy="799363"/>
-          </a:xfrm>
-        </p:spPr>
-        <p:txBody>
-          <a:bodyPr>
-            <a:normAutofit/>
-          </a:bodyPr>
-          <a:lstStyle/>
-          <a:p>
-            <a:r>
-              <a:rPr lang="fr-FR" sz="1600" dirty="0" smtClean="0"/>
-              <a:t>Familiarité avec les jeux-vidéos</a:t>
-            </a:r>
-            <a:endParaRPr lang="fr-CH" sz="1200" dirty="0"/>
-          </a:p>
-          <a:p>
-            <a:r>
-              <a:rPr lang="fr-FR" sz="1600" dirty="0" smtClean="0"/>
-              <a:t>Stresse au quotidien</a:t>
-            </a:r>
-          </a:p>
-        </p:txBody>
-      </p:sp>
-    </p:spTree>
-    <p:extLst>
-      <p:ext uri="{BB962C8B-B14F-4D97-AF65-F5344CB8AC3E}">
-        <p14:creationId xmlns:p14="http://schemas.microsoft.com/office/powerpoint/2010/main" val="4284955040"/>
-      </p:ext>
-    </p:extLst>
-  </p:cSld>
-  <p:clrMapOvr>
-    <a:masterClrMapping/>
-  </p:clrMapOvr>
-  <mc:AlternateContent xmlns:mc="http://schemas.openxmlformats.org/markup-compatibility/2006">
-    <mc:Choice xmlns:p14="http://schemas.microsoft.com/office/powerpoint/2010/main" Requires="p14">
-      <p:transition spd="slow" p14:dur="2000"/>
-    </mc:Choice>
-    <mc:Fallback>
-      <p:transition spd="slow"/>
-    </mc:Fallback>
-  </mc:AlternateContent>
   <p:timing>
     <p:tnLst>
       <p:par>

</xml_diff>